<commit_message>
Add ML Models presentation and web scan folder; update Pen testing presentation
</commit_message>
<xml_diff>
--- a/Presentations/Pen testing for web.pptx
+++ b/Presentations/Pen testing for web.pptx
@@ -3382,7 +3382,7 @@
           <a:p>
             <a:fld id="{67D21E7C-C48A-4382-8129-2FB70428EF9A}" type="datetimeFigureOut">
               <a:rPr lang="en-US" smtClean="0"/>
-              <a:t>24/10/2025</a:t>
+              <a:t>26/10/2025</a:t>
             </a:fld>
             <a:endParaRPr lang="en-US"/>
           </a:p>
@@ -3714,6 +3714,90 @@
           <a:p>
             <a:fld id="{146666D2-9007-4053-9F04-600945F14BF2}" type="slidenum">
               <a:rPr lang="en-US" smtClean="0"/>
+              <a:t>1</a:t>
+            </a:fld>
+            <a:endParaRPr lang="en-US"/>
+          </a:p>
+        </p:txBody>
+      </p:sp>
+    </p:spTree>
+    <p:extLst>
+      <p:ext uri="{BB962C8B-B14F-4D97-AF65-F5344CB8AC3E}">
+        <p14:creationId xmlns:p14="http://schemas.microsoft.com/office/powerpoint/2010/main" val="562688810"/>
+      </p:ext>
+    </p:extLst>
+  </p:cSld>
+  <p:clrMapOvr>
+    <a:masterClrMapping/>
+  </p:clrMapOvr>
+</p:notes>
+</file>
+
+<file path=ppt/notesSlides/notesSlide2.xml><?xml version="1.0" encoding="utf-8"?>
+<p:notes xmlns:a="http://schemas.openxmlformats.org/drawingml/2006/main" xmlns:r="http://schemas.openxmlformats.org/officeDocument/2006/relationships" xmlns:p="http://schemas.openxmlformats.org/presentationml/2006/main">
+  <p:cSld>
+    <p:spTree>
+      <p:nvGrpSpPr>
+        <p:cNvPr id="1" name=""/>
+        <p:cNvGrpSpPr/>
+        <p:nvPr/>
+      </p:nvGrpSpPr>
+      <p:grpSpPr>
+        <a:xfrm>
+          <a:off x="0" y="0"/>
+          <a:ext cx="0" cy="0"/>
+          <a:chOff x="0" y="0"/>
+          <a:chExt cx="0" cy="0"/>
+        </a:xfrm>
+      </p:grpSpPr>
+      <p:sp>
+        <p:nvSpPr>
+          <p:cNvPr id="2" name="Slide Image Placeholder 1"/>
+          <p:cNvSpPr>
+            <a:spLocks noGrp="1" noRot="1" noChangeAspect="1"/>
+          </p:cNvSpPr>
+          <p:nvPr>
+            <p:ph type="sldImg"/>
+          </p:nvPr>
+        </p:nvSpPr>
+        <p:spPr/>
+      </p:sp>
+      <p:sp>
+        <p:nvSpPr>
+          <p:cNvPr id="3" name="Notes Placeholder 2"/>
+          <p:cNvSpPr>
+            <a:spLocks noGrp="1"/>
+          </p:cNvSpPr>
+          <p:nvPr>
+            <p:ph type="body" idx="1"/>
+          </p:nvPr>
+        </p:nvSpPr>
+        <p:spPr/>
+        <p:txBody>
+          <a:bodyPr/>
+          <a:lstStyle/>
+          <a:p>
+            <a:endParaRPr lang="en-US" dirty="0"/>
+          </a:p>
+        </p:txBody>
+      </p:sp>
+      <p:sp>
+        <p:nvSpPr>
+          <p:cNvPr id="4" name="Slide Number Placeholder 3"/>
+          <p:cNvSpPr>
+            <a:spLocks noGrp="1"/>
+          </p:cNvSpPr>
+          <p:nvPr>
+            <p:ph type="sldNum" sz="quarter" idx="5"/>
+          </p:nvPr>
+        </p:nvSpPr>
+        <p:spPr/>
+        <p:txBody>
+          <a:bodyPr/>
+          <a:lstStyle/>
+          <a:p>
+            <a:fld id="{146666D2-9007-4053-9F04-600945F14BF2}" type="slidenum">
+              <a:rPr lang="en-US" smtClean="0"/>
               <a:t>5</a:t>
             </a:fld>
             <a:endParaRPr lang="en-US"/>
@@ -3724,6 +3808,90 @@
     <p:extLst>
       <p:ext uri="{BB962C8B-B14F-4D97-AF65-F5344CB8AC3E}">
         <p14:creationId xmlns:p14="http://schemas.microsoft.com/office/powerpoint/2010/main" val="4175227445"/>
+      </p:ext>
+    </p:extLst>
+  </p:cSld>
+  <p:clrMapOvr>
+    <a:masterClrMapping/>
+  </p:clrMapOvr>
+</p:notes>
+</file>
+
+<file path=ppt/notesSlides/notesSlide3.xml><?xml version="1.0" encoding="utf-8"?>
+<p:notes xmlns:a="http://schemas.openxmlformats.org/drawingml/2006/main" xmlns:r="http://schemas.openxmlformats.org/officeDocument/2006/relationships" xmlns:p="http://schemas.openxmlformats.org/presentationml/2006/main">
+  <p:cSld>
+    <p:spTree>
+      <p:nvGrpSpPr>
+        <p:cNvPr id="1" name=""/>
+        <p:cNvGrpSpPr/>
+        <p:nvPr/>
+      </p:nvGrpSpPr>
+      <p:grpSpPr>
+        <a:xfrm>
+          <a:off x="0" y="0"/>
+          <a:ext cx="0" cy="0"/>
+          <a:chOff x="0" y="0"/>
+          <a:chExt cx="0" cy="0"/>
+        </a:xfrm>
+      </p:grpSpPr>
+      <p:sp>
+        <p:nvSpPr>
+          <p:cNvPr id="2" name="Slide Image Placeholder 1"/>
+          <p:cNvSpPr>
+            <a:spLocks noGrp="1" noRot="1" noChangeAspect="1"/>
+          </p:cNvSpPr>
+          <p:nvPr>
+            <p:ph type="sldImg"/>
+          </p:nvPr>
+        </p:nvSpPr>
+        <p:spPr/>
+      </p:sp>
+      <p:sp>
+        <p:nvSpPr>
+          <p:cNvPr id="3" name="Notes Placeholder 2"/>
+          <p:cNvSpPr>
+            <a:spLocks noGrp="1"/>
+          </p:cNvSpPr>
+          <p:nvPr>
+            <p:ph type="body" idx="1"/>
+          </p:nvPr>
+        </p:nvSpPr>
+        <p:spPr/>
+        <p:txBody>
+          <a:bodyPr/>
+          <a:lstStyle/>
+          <a:p>
+            <a:endParaRPr lang="en-US" dirty="0"/>
+          </a:p>
+        </p:txBody>
+      </p:sp>
+      <p:sp>
+        <p:nvSpPr>
+          <p:cNvPr id="4" name="Slide Number Placeholder 3"/>
+          <p:cNvSpPr>
+            <a:spLocks noGrp="1"/>
+          </p:cNvSpPr>
+          <p:nvPr>
+            <p:ph type="sldNum" sz="quarter" idx="5"/>
+          </p:nvPr>
+        </p:nvSpPr>
+        <p:spPr/>
+        <p:txBody>
+          <a:bodyPr/>
+          <a:lstStyle/>
+          <a:p>
+            <a:fld id="{146666D2-9007-4053-9F04-600945F14BF2}" type="slidenum">
+              <a:rPr lang="en-US" smtClean="0"/>
+              <a:t>8</a:t>
+            </a:fld>
+            <a:endParaRPr lang="en-US"/>
+          </a:p>
+        </p:txBody>
+      </p:sp>
+    </p:spTree>
+    <p:extLst>
+      <p:ext uri="{BB962C8B-B14F-4D97-AF65-F5344CB8AC3E}">
+        <p14:creationId xmlns:p14="http://schemas.microsoft.com/office/powerpoint/2010/main" val="3095527295"/>
       </p:ext>
     </p:extLst>
   </p:cSld>
@@ -4534,7 +4702,7 @@
           <a:p>
             <a:fld id="{1F8F6D8A-77B6-4768-A7A6-A570DEF08796}" type="datetimeFigureOut">
               <a:rPr lang="en-US" smtClean="0"/>
-              <a:t>24/10/2025</a:t>
+              <a:t>26/10/2025</a:t>
             </a:fld>
             <a:endParaRPr lang="en-US"/>
           </a:p>
@@ -4785,7 +4953,7 @@
           <a:p>
             <a:fld id="{1F8F6D8A-77B6-4768-A7A6-A570DEF08796}" type="datetimeFigureOut">
               <a:rPr lang="en-US" smtClean="0"/>
-              <a:t>24/10/2025</a:t>
+              <a:t>26/10/2025</a:t>
             </a:fld>
             <a:endParaRPr lang="en-US"/>
           </a:p>
@@ -5099,7 +5267,7 @@
           <a:p>
             <a:fld id="{1F8F6D8A-77B6-4768-A7A6-A570DEF08796}" type="datetimeFigureOut">
               <a:rPr lang="en-US" smtClean="0"/>
-              <a:t>24/10/2025</a:t>
+              <a:t>26/10/2025</a:t>
             </a:fld>
             <a:endParaRPr lang="en-US"/>
           </a:p>
@@ -5432,7 +5600,7 @@
           <a:p>
             <a:fld id="{1F8F6D8A-77B6-4768-A7A6-A570DEF08796}" type="datetimeFigureOut">
               <a:rPr lang="en-US" smtClean="0"/>
-              <a:t>24/10/2025</a:t>
+              <a:t>26/10/2025</a:t>
             </a:fld>
             <a:endParaRPr lang="en-US"/>
           </a:p>
@@ -5746,7 +5914,7 @@
           <a:p>
             <a:fld id="{1F8F6D8A-77B6-4768-A7A6-A570DEF08796}" type="datetimeFigureOut">
               <a:rPr lang="en-US" smtClean="0"/>
-              <a:t>24/10/2025</a:t>
+              <a:t>26/10/2025</a:t>
             </a:fld>
             <a:endParaRPr lang="en-US"/>
           </a:p>
@@ -6139,7 +6307,7 @@
           <a:p>
             <a:fld id="{1F8F6D8A-77B6-4768-A7A6-A570DEF08796}" type="datetimeFigureOut">
               <a:rPr lang="en-US" smtClean="0"/>
-              <a:t>24/10/2025</a:t>
+              <a:t>26/10/2025</a:t>
             </a:fld>
             <a:endParaRPr lang="en-US"/>
           </a:p>
@@ -6309,7 +6477,7 @@
           <a:p>
             <a:fld id="{1F8F6D8A-77B6-4768-A7A6-A570DEF08796}" type="datetimeFigureOut">
               <a:rPr lang="en-US" smtClean="0"/>
-              <a:t>24/10/2025</a:t>
+              <a:t>26/10/2025</a:t>
             </a:fld>
             <a:endParaRPr lang="en-US"/>
           </a:p>
@@ -6489,7 +6657,7 @@
           <a:p>
             <a:fld id="{1F8F6D8A-77B6-4768-A7A6-A570DEF08796}" type="datetimeFigureOut">
               <a:rPr lang="en-US" smtClean="0"/>
-              <a:t>24/10/2025</a:t>
+              <a:t>26/10/2025</a:t>
             </a:fld>
             <a:endParaRPr lang="en-US"/>
           </a:p>
@@ -6659,7 +6827,7 @@
           <a:p>
             <a:fld id="{1F8F6D8A-77B6-4768-A7A6-A570DEF08796}" type="datetimeFigureOut">
               <a:rPr lang="en-US" smtClean="0"/>
-              <a:t>24/10/2025</a:t>
+              <a:t>26/10/2025</a:t>
             </a:fld>
             <a:endParaRPr lang="en-US"/>
           </a:p>
@@ -6906,7 +7074,7 @@
           <a:p>
             <a:fld id="{1F8F6D8A-77B6-4768-A7A6-A570DEF08796}" type="datetimeFigureOut">
               <a:rPr lang="en-US" smtClean="0"/>
-              <a:t>24/10/2025</a:t>
+              <a:t>26/10/2025</a:t>
             </a:fld>
             <a:endParaRPr lang="en-US"/>
           </a:p>
@@ -7138,7 +7306,7 @@
           <a:p>
             <a:fld id="{1F8F6D8A-77B6-4768-A7A6-A570DEF08796}" type="datetimeFigureOut">
               <a:rPr lang="en-US" smtClean="0"/>
-              <a:t>24/10/2025</a:t>
+              <a:t>26/10/2025</a:t>
             </a:fld>
             <a:endParaRPr lang="en-US"/>
           </a:p>
@@ -7512,7 +7680,7 @@
           <a:p>
             <a:fld id="{1F8F6D8A-77B6-4768-A7A6-A570DEF08796}" type="datetimeFigureOut">
               <a:rPr lang="en-US" smtClean="0"/>
-              <a:t>24/10/2025</a:t>
+              <a:t>26/10/2025</a:t>
             </a:fld>
             <a:endParaRPr lang="en-US"/>
           </a:p>
@@ -7635,7 +7803,7 @@
           <a:p>
             <a:fld id="{1F8F6D8A-77B6-4768-A7A6-A570DEF08796}" type="datetimeFigureOut">
               <a:rPr lang="en-US" smtClean="0"/>
-              <a:t>24/10/2025</a:t>
+              <a:t>26/10/2025</a:t>
             </a:fld>
             <a:endParaRPr lang="en-US"/>
           </a:p>
@@ -7730,7 +7898,7 @@
           <a:p>
             <a:fld id="{1F8F6D8A-77B6-4768-A7A6-A570DEF08796}" type="datetimeFigureOut">
               <a:rPr lang="en-US" smtClean="0"/>
-              <a:t>24/10/2025</a:t>
+              <a:t>26/10/2025</a:t>
             </a:fld>
             <a:endParaRPr lang="en-US"/>
           </a:p>
@@ -7985,7 +8153,7 @@
           <a:p>
             <a:fld id="{1F8F6D8A-77B6-4768-A7A6-A570DEF08796}" type="datetimeFigureOut">
               <a:rPr lang="en-US" smtClean="0"/>
-              <a:t>24/10/2025</a:t>
+              <a:t>26/10/2025</a:t>
             </a:fld>
             <a:endParaRPr lang="en-US"/>
           </a:p>
@@ -8290,7 +8458,7 @@
           <a:p>
             <a:fld id="{1F8F6D8A-77B6-4768-A7A6-A570DEF08796}" type="datetimeFigureOut">
               <a:rPr lang="en-US" smtClean="0"/>
-              <a:t>24/10/2025</a:t>
+              <a:t>26/10/2025</a:t>
             </a:fld>
             <a:endParaRPr lang="en-US"/>
           </a:p>
@@ -9048,7 +9216,7 @@
           <a:p>
             <a:fld id="{1F8F6D8A-77B6-4768-A7A6-A570DEF08796}" type="datetimeFigureOut">
               <a:rPr lang="en-US" smtClean="0"/>
-              <a:t>24/10/2025</a:t>
+              <a:t>26/10/2025</a:t>
             </a:fld>
             <a:endParaRPr lang="en-US"/>
           </a:p>
@@ -9709,7 +9877,7 @@
           <p:nvPr/>
         </p:nvPicPr>
         <p:blipFill>
-          <a:blip r:embed="rId2">
+          <a:blip r:embed="rId3">
             <a:extLst>
               <a:ext uri="{28A0092B-C50C-407E-A947-70E740481C1C}">
                 <a14:useLocalDpi xmlns:a14="http://schemas.microsoft.com/office/drawing/2010/main" val="0"/>
@@ -10868,7 +11036,7 @@
                 <a:latin typeface="Times New Roman" panose="02020603050405020304" pitchFamily="18" charset="0"/>
                 <a:cs typeface="Times New Roman" panose="02020603050405020304" pitchFamily="18" charset="0"/>
               </a:rPr>
-              <a:t>Thanks for your attention</a:t>
+              <a:t>Thanks for your attention!!</a:t>
             </a:r>
           </a:p>
         </p:txBody>

</xml_diff>